<commit_message>
Updated figures with most recent versions
Replaced PowerPoints with updated graphics and uploaded corresponding
vector graphic PDFs
</commit_message>
<xml_diff>
--- a/writing/figures/Phylosift_DBupdate.pptx
+++ b/writing/figures/Phylosift_DBupdate.pptx
@@ -295,7 +295,7 @@
           <a:p>
             <a:fld id="{1EB31AE5-1B8F-5848-93B8-66F20C8DE389}" type="datetimeFigureOut">
               <a:rPr lang="en-US" smtClean="0"/>
-              <a:t>5/3/12</a:t>
+              <a:t>5/30/12</a:t>
             </a:fld>
             <a:endParaRPr lang="en-US"/>
           </a:p>
@@ -465,7 +465,7 @@
           <a:p>
             <a:fld id="{1EB31AE5-1B8F-5848-93B8-66F20C8DE389}" type="datetimeFigureOut">
               <a:rPr lang="en-US" smtClean="0"/>
-              <a:t>5/3/12</a:t>
+              <a:t>5/30/12</a:t>
             </a:fld>
             <a:endParaRPr lang="en-US"/>
           </a:p>
@@ -645,7 +645,7 @@
           <a:p>
             <a:fld id="{1EB31AE5-1B8F-5848-93B8-66F20C8DE389}" type="datetimeFigureOut">
               <a:rPr lang="en-US" smtClean="0"/>
-              <a:t>5/3/12</a:t>
+              <a:t>5/30/12</a:t>
             </a:fld>
             <a:endParaRPr lang="en-US"/>
           </a:p>
@@ -815,7 +815,7 @@
           <a:p>
             <a:fld id="{1EB31AE5-1B8F-5848-93B8-66F20C8DE389}" type="datetimeFigureOut">
               <a:rPr lang="en-US" smtClean="0"/>
-              <a:t>5/3/12</a:t>
+              <a:t>5/30/12</a:t>
             </a:fld>
             <a:endParaRPr lang="en-US"/>
           </a:p>
@@ -1061,7 +1061,7 @@
           <a:p>
             <a:fld id="{1EB31AE5-1B8F-5848-93B8-66F20C8DE389}" type="datetimeFigureOut">
               <a:rPr lang="en-US" smtClean="0"/>
-              <a:t>5/3/12</a:t>
+              <a:t>5/30/12</a:t>
             </a:fld>
             <a:endParaRPr lang="en-US"/>
           </a:p>
@@ -1349,7 +1349,7 @@
           <a:p>
             <a:fld id="{1EB31AE5-1B8F-5848-93B8-66F20C8DE389}" type="datetimeFigureOut">
               <a:rPr lang="en-US" smtClean="0"/>
-              <a:t>5/3/12</a:t>
+              <a:t>5/30/12</a:t>
             </a:fld>
             <a:endParaRPr lang="en-US"/>
           </a:p>
@@ -1776,7 +1776,7 @@
           <a:p>
             <a:fld id="{1EB31AE5-1B8F-5848-93B8-66F20C8DE389}" type="datetimeFigureOut">
               <a:rPr lang="en-US" smtClean="0"/>
-              <a:t>5/3/12</a:t>
+              <a:t>5/30/12</a:t>
             </a:fld>
             <a:endParaRPr lang="en-US"/>
           </a:p>
@@ -1894,7 +1894,7 @@
           <a:p>
             <a:fld id="{1EB31AE5-1B8F-5848-93B8-66F20C8DE389}" type="datetimeFigureOut">
               <a:rPr lang="en-US" smtClean="0"/>
-              <a:t>5/3/12</a:t>
+              <a:t>5/30/12</a:t>
             </a:fld>
             <a:endParaRPr lang="en-US"/>
           </a:p>
@@ -1989,7 +1989,7 @@
           <a:p>
             <a:fld id="{1EB31AE5-1B8F-5848-93B8-66F20C8DE389}" type="datetimeFigureOut">
               <a:rPr lang="en-US" smtClean="0"/>
-              <a:t>5/3/12</a:t>
+              <a:t>5/30/12</a:t>
             </a:fld>
             <a:endParaRPr lang="en-US"/>
           </a:p>
@@ -2266,7 +2266,7 @@
           <a:p>
             <a:fld id="{1EB31AE5-1B8F-5848-93B8-66F20C8DE389}" type="datetimeFigureOut">
               <a:rPr lang="en-US" smtClean="0"/>
-              <a:t>5/3/12</a:t>
+              <a:t>5/30/12</a:t>
             </a:fld>
             <a:endParaRPr lang="en-US"/>
           </a:p>
@@ -2519,7 +2519,7 @@
           <a:p>
             <a:fld id="{1EB31AE5-1B8F-5848-93B8-66F20C8DE389}" type="datetimeFigureOut">
               <a:rPr lang="en-US" smtClean="0"/>
-              <a:t>5/3/12</a:t>
+              <a:t>5/30/12</a:t>
             </a:fld>
             <a:endParaRPr lang="en-US"/>
           </a:p>
@@ -2732,7 +2732,7 @@
           <a:p>
             <a:fld id="{1EB31AE5-1B8F-5848-93B8-66F20C8DE389}" type="datetimeFigureOut">
               <a:rPr lang="en-US" smtClean="0"/>
-              <a:t>5/3/12</a:t>
+              <a:t>5/30/12</a:t>
             </a:fld>
             <a:endParaRPr lang="en-US"/>
           </a:p>
@@ -3115,7 +3115,7 @@
         </p:nvGrpSpPr>
         <p:grpSpPr>
           <a:xfrm>
-            <a:off x="6148919" y="6951130"/>
+            <a:off x="6172203" y="6951130"/>
             <a:ext cx="2298700" cy="952500"/>
             <a:chOff x="4191000" y="2908300"/>
             <a:chExt cx="2298700" cy="952500"/>
@@ -3358,12 +3358,13 @@
           <a:prstGeom prst="straightConnector1">
             <a:avLst/>
           </a:prstGeom>
-          <a:ln w="50800">
+          <a:ln w="60325">
             <a:solidFill>
               <a:schemeClr val="tx1"/>
             </a:solidFill>
             <a:tailEnd type="triangle" w="lg" len="med"/>
           </a:ln>
+          <a:effectLst/>
         </p:spPr>
         <p:style>
           <a:lnRef idx="2">
@@ -3390,18 +3391,19 @@
         </p:nvCxnSpPr>
         <p:spPr>
           <a:xfrm flipH="1">
-            <a:off x="7298269" y="6140111"/>
-            <a:ext cx="1159933" cy="811019"/>
+            <a:off x="7321553" y="6140111"/>
+            <a:ext cx="1136650" cy="811019"/>
           </a:xfrm>
           <a:prstGeom prst="straightConnector1">
             <a:avLst/>
           </a:prstGeom>
-          <a:ln w="50800">
+          <a:ln w="60325">
             <a:solidFill>
               <a:schemeClr val="tx1"/>
             </a:solidFill>
             <a:tailEnd type="triangle" w="lg" len="med"/>
           </a:ln>
+          <a:effectLst/>
         </p:spPr>
         <p:style>
           <a:lnRef idx="2">
@@ -3476,8 +3478,8 @@
         </p:nvSpPr>
         <p:spPr>
           <a:xfrm>
-            <a:off x="3369733" y="8878603"/>
-            <a:ext cx="2689747" cy="646331"/>
+            <a:off x="2833165" y="8743139"/>
+            <a:ext cx="3226316" cy="923330"/>
           </a:xfrm>
           <a:prstGeom prst="rect">
             <a:avLst/>
@@ -3490,10 +3492,18 @@
           </a:bodyPr>
           <a:lstStyle/>
           <a:p>
-            <a:pPr algn="ctr"/>
+            <a:pPr algn="r"/>
             <a:r>
               <a:rPr lang="en-US" sz="1800" dirty="0" smtClean="0"/>
-              <a:t>Reference tree pruned at 0.02 PD </a:t>
+              <a:t>A taxa set is selected with a </a:t>
+            </a:r>
+            <a:r>
+              <a:rPr lang="en-US" sz="1800" dirty="0" err="1" smtClean="0"/>
+              <a:t>maxPD</a:t>
+            </a:r>
+            <a:r>
+              <a:rPr lang="en-US" sz="1800" dirty="0" smtClean="0"/>
+              <a:t> cutoff of 0.02 and a new tree is inferred</a:t>
             </a:r>
           </a:p>
         </p:txBody>
@@ -3617,12 +3627,13 @@
           <a:prstGeom prst="straightConnector1">
             <a:avLst/>
           </a:prstGeom>
-          <a:ln w="50800">
+          <a:ln w="60325">
             <a:solidFill>
               <a:schemeClr val="tx1"/>
             </a:solidFill>
             <a:tailEnd type="triangle" w="lg" len="med"/>
           </a:ln>
+          <a:effectLst/>
         </p:spPr>
         <p:style>
           <a:lnRef idx="2">
@@ -3639,36 +3650,6 @@
           </a:fontRef>
         </p:style>
       </p:cxnSp>
-      <p:sp>
-        <p:nvSpPr>
-          <p:cNvPr id="43" name="TextBox 42"/>
-          <p:cNvSpPr txBox="1"/>
-          <p:nvPr/>
-        </p:nvSpPr>
-        <p:spPr>
-          <a:xfrm>
-            <a:off x="11331056" y="10644428"/>
-            <a:ext cx="3080991" cy="646331"/>
-          </a:xfrm>
-          <a:prstGeom prst="rect">
-            <a:avLst/>
-          </a:prstGeom>
-          <a:noFill/>
-        </p:spPr>
-        <p:txBody>
-          <a:bodyPr wrap="square" rtlCol="0">
-            <a:spAutoFit/>
-          </a:bodyPr>
-          <a:lstStyle/>
-          <a:p>
-            <a:r>
-              <a:rPr lang="en-US" sz="1800" dirty="0" smtClean="0"/>
-              <a:t>Updated codon subtrees added to DB</a:t>
-            </a:r>
-            <a:endParaRPr lang="en-US" sz="1800" dirty="0"/>
-          </a:p>
-        </p:txBody>
-      </p:sp>
       <p:grpSp>
         <p:nvGrpSpPr>
           <p:cNvPr id="44" name="Group 43"/>
@@ -3677,7 +3658,7 @@
         </p:nvGrpSpPr>
         <p:grpSpPr>
           <a:xfrm>
-            <a:off x="7315200" y="5198530"/>
+            <a:off x="7289800" y="5198530"/>
             <a:ext cx="2298700" cy="952500"/>
             <a:chOff x="4191000" y="2908300"/>
             <a:chExt cx="2298700" cy="952500"/>
@@ -3800,23 +3781,26 @@
       <p:cxnSp>
         <p:nvCxnSpPr>
           <p:cNvPr id="47" name="Straight Arrow Connector 46"/>
-          <p:cNvCxnSpPr/>
+          <p:cNvCxnSpPr>
+            <a:stCxn id="19" idx="2"/>
+          </p:cNvCxnSpPr>
           <p:nvPr/>
         </p:nvCxnSpPr>
         <p:spPr>
           <a:xfrm>
-            <a:off x="8462431" y="4432304"/>
-            <a:ext cx="0" cy="732713"/>
+            <a:off x="8439150" y="4412365"/>
+            <a:ext cx="0" cy="752652"/>
           </a:xfrm>
           <a:prstGeom prst="straightConnector1">
             <a:avLst/>
           </a:prstGeom>
-          <a:ln w="50800">
+          <a:ln w="60325">
             <a:solidFill>
               <a:schemeClr val="tx1"/>
             </a:solidFill>
             <a:tailEnd type="triangle" w="lg" len="med"/>
           </a:ln>
+          <a:effectLst/>
         </p:spPr>
         <p:style>
           <a:lnRef idx="2">
@@ -3841,7 +3825,7 @@
         </p:nvSpPr>
         <p:spPr>
           <a:xfrm>
-            <a:off x="8697380" y="8698573"/>
+            <a:off x="8692090" y="8692686"/>
             <a:ext cx="2298700" cy="952500"/>
           </a:xfrm>
           <a:prstGeom prst="roundRect">
@@ -3884,23 +3868,26 @@
       <p:cxnSp>
         <p:nvCxnSpPr>
           <p:cNvPr id="52" name="Straight Arrow Connector 51"/>
-          <p:cNvCxnSpPr/>
+          <p:cNvCxnSpPr>
+            <a:stCxn id="74" idx="2"/>
+          </p:cNvCxnSpPr>
           <p:nvPr/>
         </p:nvCxnSpPr>
         <p:spPr>
           <a:xfrm>
-            <a:off x="9844611" y="7932347"/>
-            <a:ext cx="0" cy="732713"/>
+            <a:off x="9841440" y="7903630"/>
+            <a:ext cx="0" cy="761430"/>
           </a:xfrm>
           <a:prstGeom prst="straightConnector1">
             <a:avLst/>
           </a:prstGeom>
-          <a:ln w="50800">
+          <a:ln w="60325">
             <a:solidFill>
               <a:schemeClr val="tx1"/>
             </a:solidFill>
             <a:tailEnd type="triangle" w="lg" len="med"/>
           </a:ln>
+          <a:effectLst/>
         </p:spPr>
         <p:style>
           <a:lnRef idx="2">
@@ -3917,74 +3904,30 @@
           </a:fontRef>
         </p:style>
       </p:cxnSp>
-      <p:sp>
-        <p:nvSpPr>
-          <p:cNvPr id="54" name="Rounded Rectangle 53"/>
-          <p:cNvSpPr/>
-          <p:nvPr/>
-        </p:nvSpPr>
-        <p:spPr>
-          <a:xfrm>
-            <a:off x="8720667" y="10511643"/>
-            <a:ext cx="2298700" cy="952500"/>
-          </a:xfrm>
-          <a:prstGeom prst="roundRect">
-            <a:avLst/>
-          </a:prstGeom>
-          <a:noFill/>
-          <a:ln>
-            <a:solidFill>
-              <a:schemeClr val="tx1"/>
-            </a:solidFill>
-          </a:ln>
-          <a:effectLst/>
-        </p:spPr>
-        <p:style>
-          <a:lnRef idx="1">
-            <a:schemeClr val="accent1"/>
-          </a:lnRef>
-          <a:fillRef idx="3">
-            <a:schemeClr val="accent1"/>
-          </a:fillRef>
-          <a:effectRef idx="2">
-            <a:schemeClr val="accent1"/>
-          </a:effectRef>
-          <a:fontRef idx="minor">
-            <a:schemeClr val="lt1"/>
-          </a:fontRef>
-        </p:style>
-        <p:txBody>
-          <a:bodyPr rtlCol="0" anchor="ctr"/>
-          <a:lstStyle/>
-          <a:p>
-            <a:pPr algn="ctr"/>
-            <a:endParaRPr lang="en-US">
-              <a:latin typeface="Georgia"/>
-              <a:cs typeface="Georgia"/>
-            </a:endParaRPr>
-          </a:p>
-        </p:txBody>
-      </p:sp>
       <p:cxnSp>
         <p:nvCxnSpPr>
           <p:cNvPr id="57" name="Straight Arrow Connector 56"/>
-          <p:cNvCxnSpPr/>
+          <p:cNvCxnSpPr>
+            <a:stCxn id="49" idx="2"/>
+            <a:endCxn id="75" idx="0"/>
+          </p:cNvCxnSpPr>
           <p:nvPr/>
         </p:nvCxnSpPr>
         <p:spPr>
-          <a:xfrm>
-            <a:off x="9867898" y="9745417"/>
-            <a:ext cx="0" cy="732713"/>
+          <a:xfrm flipH="1">
+            <a:off x="8651874" y="9645186"/>
+            <a:ext cx="1189566" cy="2563744"/>
           </a:xfrm>
           <a:prstGeom prst="straightConnector1">
             <a:avLst/>
           </a:prstGeom>
-          <a:ln w="50800">
+          <a:ln w="60325">
             <a:solidFill>
               <a:schemeClr val="tx1"/>
             </a:solidFill>
             <a:tailEnd type="triangle" w="lg" len="med"/>
           </a:ln>
+          <a:effectLst/>
         </p:spPr>
         <p:style>
           <a:lnRef idx="2">
@@ -4009,8 +3952,8 @@
         </p:nvSpPr>
         <p:spPr>
           <a:xfrm>
-            <a:off x="11069072" y="8878603"/>
-            <a:ext cx="4097978" cy="646331"/>
+            <a:off x="11069072" y="8607675"/>
+            <a:ext cx="4097978" cy="1200329"/>
           </a:xfrm>
           <a:prstGeom prst="rect">
             <a:avLst/>
@@ -4025,7 +3968,7 @@
           <a:p>
             <a:r>
               <a:rPr lang="en-US" sz="1800" dirty="0" smtClean="0"/>
-              <a:t>PD metric used to split guide tree into smaller subtrees</a:t>
+              <a:t>PD metric used to split guide tree into smaller subtrees; subsets of taxa are selected such that no branch connecting them has length &gt;0.X for some value of X</a:t>
             </a:r>
             <a:endParaRPr lang="en-US" sz="1800" dirty="0"/>
           </a:p>
@@ -4357,7 +4300,7 @@
         </p:nvGrpSpPr>
         <p:grpSpPr>
           <a:xfrm>
-            <a:off x="8686800" y="6951130"/>
+            <a:off x="8692090" y="6951130"/>
             <a:ext cx="2298700" cy="952500"/>
             <a:chOff x="4191000" y="2908300"/>
             <a:chExt cx="2298700" cy="952500"/>
@@ -4460,17 +4403,18 @@
         <p:spPr>
           <a:xfrm>
             <a:off x="8458202" y="6140111"/>
-            <a:ext cx="1377948" cy="811019"/>
+            <a:ext cx="1383238" cy="811019"/>
           </a:xfrm>
           <a:prstGeom prst="straightConnector1">
             <a:avLst/>
           </a:prstGeom>
-          <a:ln w="50800">
+          <a:ln w="60325">
             <a:solidFill>
               <a:schemeClr val="tx1"/>
             </a:solidFill>
             <a:tailEnd type="triangle" w="lg" len="med"/>
           </a:ln>
+          <a:effectLst/>
         </p:spPr>
         <p:style>
           <a:lnRef idx="2">
@@ -4495,7 +4439,7 @@
         </p:nvGrpSpPr>
         <p:grpSpPr>
           <a:xfrm>
-            <a:off x="6172200" y="8686800"/>
+            <a:off x="6172203" y="8692686"/>
             <a:ext cx="2298700" cy="952500"/>
             <a:chOff x="4191000" y="2908300"/>
             <a:chExt cx="2298700" cy="952500"/>
@@ -4590,23 +4534,26 @@
       <p:cxnSp>
         <p:nvCxnSpPr>
           <p:cNvPr id="90" name="Straight Arrow Connector 89"/>
-          <p:cNvCxnSpPr/>
+          <p:cNvCxnSpPr>
+            <a:stCxn id="11" idx="2"/>
+          </p:cNvCxnSpPr>
           <p:nvPr/>
         </p:nvCxnSpPr>
         <p:spPr>
           <a:xfrm>
-            <a:off x="7319431" y="7920574"/>
-            <a:ext cx="0" cy="732713"/>
+            <a:off x="7319434" y="7872398"/>
+            <a:ext cx="2119" cy="780889"/>
           </a:xfrm>
           <a:prstGeom prst="straightConnector1">
             <a:avLst/>
           </a:prstGeom>
-          <a:ln w="50800">
+          <a:ln w="60325">
             <a:solidFill>
               <a:schemeClr val="tx1"/>
             </a:solidFill>
             <a:tailEnd type="triangle" w="lg" len="med"/>
           </a:ln>
+          <a:effectLst/>
         </p:spPr>
         <p:style>
           <a:lnRef idx="2">
@@ -4631,7 +4578,7 @@
         </p:nvGrpSpPr>
         <p:grpSpPr>
           <a:xfrm>
-            <a:off x="6195487" y="10499870"/>
+            <a:off x="6172203" y="10499870"/>
             <a:ext cx="2298700" cy="952500"/>
             <a:chOff x="4191000" y="2908300"/>
             <a:chExt cx="2298700" cy="952500"/>
@@ -4693,8 +4640,8 @@
           </p:nvSpPr>
           <p:spPr>
             <a:xfrm>
-              <a:off x="4339164" y="3052858"/>
-              <a:ext cx="2032000" cy="707886"/>
+              <a:off x="4339164" y="2917394"/>
+              <a:ext cx="2032000" cy="923330"/>
             </a:xfrm>
             <a:prstGeom prst="rect">
               <a:avLst/>
@@ -4709,13 +4656,13 @@
             <a:p>
               <a:pPr algn="ctr"/>
               <a:r>
-                <a:rPr lang="en-US" sz="2000" dirty="0" smtClean="0">
+                <a:rPr lang="en-US" sz="1800" dirty="0" smtClean="0">
                   <a:latin typeface="Helvetica Neue"/>
                   <a:cs typeface="Helvetica Neue"/>
                 </a:rPr>
-                <a:t>Update DB with new sequences</a:t>
+                <a:t>Update reference sequences with new data</a:t>
               </a:r>
-              <a:endParaRPr lang="en-US" sz="2000" dirty="0">
+              <a:endParaRPr lang="en-US" sz="1800" dirty="0">
                 <a:latin typeface="Helvetica Neue"/>
                 <a:cs typeface="Helvetica Neue"/>
               </a:endParaRPr>
@@ -4726,23 +4673,26 @@
       <p:cxnSp>
         <p:nvCxnSpPr>
           <p:cNvPr id="94" name="Straight Arrow Connector 93"/>
-          <p:cNvCxnSpPr/>
+          <p:cNvCxnSpPr>
+            <a:stCxn id="88" idx="2"/>
+          </p:cNvCxnSpPr>
           <p:nvPr/>
         </p:nvCxnSpPr>
         <p:spPr>
           <a:xfrm>
-            <a:off x="7342718" y="9733644"/>
-            <a:ext cx="0" cy="732713"/>
+            <a:off x="7321553" y="9645186"/>
+            <a:ext cx="0" cy="821171"/>
           </a:xfrm>
           <a:prstGeom prst="straightConnector1">
             <a:avLst/>
           </a:prstGeom>
-          <a:ln w="50800">
+          <a:ln w="60325">
             <a:solidFill>
               <a:schemeClr val="tx1"/>
             </a:solidFill>
             <a:tailEnd type="triangle" w="lg" len="med"/>
           </a:ln>
+          <a:effectLst/>
         </p:spPr>
         <p:style>
           <a:lnRef idx="2">
@@ -4767,8 +4717,8 @@
         </p:nvSpPr>
         <p:spPr>
           <a:xfrm>
-            <a:off x="1964267" y="10393112"/>
-            <a:ext cx="4207933" cy="1477328"/>
+            <a:off x="1913467" y="10308447"/>
+            <a:ext cx="4241799" cy="1477328"/>
           </a:xfrm>
           <a:prstGeom prst="rect">
             <a:avLst/>
@@ -4781,14 +4731,14 @@
           </a:bodyPr>
           <a:lstStyle/>
           <a:p>
-            <a:pPr algn="ctr"/>
+            <a:pPr algn="r"/>
             <a:r>
               <a:rPr lang="en-US" sz="1800" dirty="0"/>
               <a:t>N</a:t>
             </a:r>
             <a:r>
               <a:rPr lang="en-US" sz="1800" dirty="0" smtClean="0"/>
-              <a:t>ew sequences at 0.25 PD for amino acid tree; higher PD threshold enables more aggressive searches of reference database, since LAST searching is faster with fewer sequences.</a:t>
+              <a:t>ew sequences added at 0.25 PD for amino acid tree; higher PD threshold enables more aggressive searches of reference database, since LAST searching is faster with fewer sequences.</a:t>
             </a:r>
           </a:p>
         </p:txBody>
@@ -4807,12 +4757,13 @@
           <a:prstGeom prst="straightConnector1">
             <a:avLst/>
           </a:prstGeom>
-          <a:ln w="50800">
+          <a:ln w="60325">
             <a:solidFill>
               <a:schemeClr val="tx1"/>
             </a:solidFill>
             <a:tailEnd type="triangle" w="lg" len="med"/>
           </a:ln>
+          <a:effectLst/>
         </p:spPr>
         <p:style>
           <a:lnRef idx="2">
@@ -4843,12 +4794,13 @@
           <a:prstGeom prst="straightConnector1">
             <a:avLst/>
           </a:prstGeom>
-          <a:ln w="50800">
+          <a:ln w="60325">
             <a:solidFill>
               <a:schemeClr val="tx1"/>
             </a:solidFill>
             <a:tailEnd type="triangle" w="lg" len="med"/>
           </a:ln>
+          <a:effectLst/>
         </p:spPr>
         <p:style>
           <a:lnRef idx="2">
@@ -4889,11 +4841,7 @@
           <a:p>
             <a:r>
               <a:rPr lang="en-US" sz="1800" dirty="0" smtClean="0"/>
-              <a:t>Reconcile NCBI taxonomy IDs with phylogenetic topologies, for both amino acid tree and codon </a:t>
-            </a:r>
-            <a:r>
-              <a:rPr lang="en-US" sz="1800" dirty="0" smtClean="0"/>
-              <a:t>subtrees</a:t>
+              <a:t>Reconcile NCBI taxonomy IDs with phylogenetic topologies, for both amino acid tree and codon subtrees</a:t>
             </a:r>
             <a:endParaRPr lang="en-US" sz="1800" dirty="0"/>
           </a:p>
@@ -4907,7 +4855,7 @@
         </p:nvGrpSpPr>
         <p:grpSpPr>
           <a:xfrm>
-            <a:off x="7467600" y="12208930"/>
+            <a:off x="7502524" y="12208930"/>
             <a:ext cx="2298700" cy="952500"/>
             <a:chOff x="4191000" y="2908300"/>
             <a:chExt cx="2298700" cy="952500"/>
@@ -5007,7 +4955,7 @@
         </p:nvSpPr>
         <p:spPr>
           <a:xfrm>
-            <a:off x="8851898" y="8723233"/>
+            <a:off x="8825440" y="8722660"/>
             <a:ext cx="2032000" cy="892552"/>
           </a:xfrm>
           <a:prstGeom prst="rect">
@@ -5030,43 +4978,6 @@
               <a:t>Codon Subtrees</a:t>
             </a:r>
             <a:endParaRPr lang="en-US" sz="2600" dirty="0">
-              <a:latin typeface="Helvetica Neue"/>
-              <a:cs typeface="Helvetica Neue"/>
-            </a:endParaRPr>
-          </a:p>
-        </p:txBody>
-      </p:sp>
-      <p:sp>
-        <p:nvSpPr>
-          <p:cNvPr id="83" name="TextBox 82"/>
-          <p:cNvSpPr txBox="1"/>
-          <p:nvPr/>
-        </p:nvSpPr>
-        <p:spPr>
-          <a:xfrm>
-            <a:off x="8851898" y="10634475"/>
-            <a:ext cx="2032000" cy="707886"/>
-          </a:xfrm>
-          <a:prstGeom prst="rect">
-            <a:avLst/>
-          </a:prstGeom>
-          <a:noFill/>
-        </p:spPr>
-        <p:txBody>
-          <a:bodyPr wrap="square" rtlCol="0">
-            <a:spAutoFit/>
-          </a:bodyPr>
-          <a:lstStyle/>
-          <a:p>
-            <a:pPr algn="ctr"/>
-            <a:r>
-              <a:rPr lang="en-US" sz="2000" dirty="0" smtClean="0">
-                <a:latin typeface="Helvetica Neue"/>
-                <a:cs typeface="Helvetica Neue"/>
-              </a:rPr>
-              <a:t>Update DB with new sequences</a:t>
-            </a:r>
-            <a:endParaRPr lang="en-US" sz="2000" dirty="0">
               <a:latin typeface="Helvetica Neue"/>
               <a:cs typeface="Helvetica Neue"/>
             </a:endParaRPr>
@@ -5081,7 +4992,7 @@
         </p:nvGrpSpPr>
         <p:grpSpPr>
           <a:xfrm>
-            <a:off x="7467600" y="14054670"/>
+            <a:off x="7502524" y="13902273"/>
             <a:ext cx="2298700" cy="952500"/>
             <a:chOff x="4191000" y="2908300"/>
             <a:chExt cx="2298700" cy="952500"/>
@@ -5183,56 +5094,19 @@
         </p:nvCxnSpPr>
         <p:spPr>
           <a:xfrm>
-            <a:off x="7344837" y="11452370"/>
-            <a:ext cx="1113363" cy="663430"/>
+            <a:off x="7321553" y="11452370"/>
+            <a:ext cx="1136647" cy="663430"/>
           </a:xfrm>
           <a:prstGeom prst="straightConnector1">
             <a:avLst/>
           </a:prstGeom>
-          <a:ln w="50800">
+          <a:ln w="60325">
             <a:solidFill>
               <a:schemeClr val="tx1"/>
             </a:solidFill>
             <a:tailEnd type="triangle" w="lg" len="med"/>
           </a:ln>
-        </p:spPr>
-        <p:style>
-          <a:lnRef idx="2">
-            <a:schemeClr val="accent1"/>
-          </a:lnRef>
-          <a:fillRef idx="0">
-            <a:schemeClr val="accent1"/>
-          </a:fillRef>
-          <a:effectRef idx="1">
-            <a:schemeClr val="accent1"/>
-          </a:effectRef>
-          <a:fontRef idx="minor">
-            <a:schemeClr val="tx1"/>
-          </a:fontRef>
-        </p:style>
-      </p:cxnSp>
-      <p:cxnSp>
-        <p:nvCxnSpPr>
-          <p:cNvPr id="100" name="Straight Arrow Connector 99"/>
-          <p:cNvCxnSpPr>
-            <a:stCxn id="54" idx="2"/>
-          </p:cNvCxnSpPr>
-          <p:nvPr/>
-        </p:nvCxnSpPr>
-        <p:spPr>
-          <a:xfrm flipH="1">
-            <a:off x="8839200" y="11464143"/>
-            <a:ext cx="1030817" cy="651657"/>
-          </a:xfrm>
-          <a:prstGeom prst="straightConnector1">
-            <a:avLst/>
-          </a:prstGeom>
-          <a:ln w="50800">
-            <a:solidFill>
-              <a:schemeClr val="tx1"/>
-            </a:solidFill>
-            <a:tailEnd type="triangle" w="lg" len="med"/>
-          </a:ln>
+          <a:effectLst/>
         </p:spPr>
         <p:style>
           <a:lnRef idx="2">
@@ -5252,23 +5126,26 @@
       <p:cxnSp>
         <p:nvCxnSpPr>
           <p:cNvPr id="101" name="Straight Arrow Connector 100"/>
-          <p:cNvCxnSpPr/>
+          <p:cNvCxnSpPr>
+            <a:stCxn id="75" idx="2"/>
+          </p:cNvCxnSpPr>
           <p:nvPr/>
         </p:nvCxnSpPr>
         <p:spPr>
           <a:xfrm>
-            <a:off x="8669867" y="13258800"/>
-            <a:ext cx="0" cy="732713"/>
+            <a:off x="8651874" y="13161430"/>
+            <a:ext cx="0" cy="728485"/>
           </a:xfrm>
           <a:prstGeom prst="straightConnector1">
             <a:avLst/>
           </a:prstGeom>
-          <a:ln w="50800">
+          <a:ln w="60325">
             <a:solidFill>
               <a:schemeClr val="tx1"/>
             </a:solidFill>
             <a:tailEnd type="triangle" w="lg" len="med"/>
           </a:ln>
+          <a:effectLst/>
         </p:spPr>
         <p:style>
           <a:lnRef idx="2">
@@ -5293,7 +5170,7 @@
         </p:nvSpPr>
         <p:spPr>
           <a:xfrm>
-            <a:off x="9664702" y="15921917"/>
+            <a:off x="9664702" y="15650989"/>
             <a:ext cx="5050367" cy="923330"/>
           </a:xfrm>
           <a:prstGeom prst="rect">
@@ -5323,10 +5200,10 @@
         </p:nvGrpSpPr>
         <p:grpSpPr>
           <a:xfrm>
-            <a:off x="7467600" y="15917338"/>
-            <a:ext cx="2298700" cy="952500"/>
-            <a:chOff x="4191000" y="2908300"/>
-            <a:chExt cx="2298700" cy="952500"/>
+            <a:off x="7450666" y="15582532"/>
+            <a:ext cx="2402417" cy="1015663"/>
+            <a:chOff x="4174066" y="2861355"/>
+            <a:chExt cx="2402417" cy="1015663"/>
           </a:xfrm>
         </p:grpSpPr>
         <p:sp>
@@ -5385,8 +5262,8 @@
           </p:nvSpPr>
           <p:spPr>
             <a:xfrm>
-              <a:off x="4290482" y="2946020"/>
-              <a:ext cx="2161118" cy="830997"/>
+              <a:off x="4174066" y="2861355"/>
+              <a:ext cx="2402417" cy="1015663"/>
             </a:xfrm>
             <a:prstGeom prst="rect">
               <a:avLst/>
@@ -5401,13 +5278,33 @@
             <a:p>
               <a:pPr algn="ctr"/>
               <a:r>
-                <a:rPr lang="en-US" sz="2400" dirty="0" smtClean="0">
+                <a:rPr lang="en-US" sz="2000" dirty="0" smtClean="0">
                   <a:latin typeface="Helvetica Neue"/>
                   <a:cs typeface="Helvetica Neue"/>
                 </a:rPr>
-                <a:t>Automated Download</a:t>
+                <a:t>Automated </a:t>
               </a:r>
-              <a:endParaRPr lang="en-US" sz="2400" dirty="0">
+            </a:p>
+            <a:p>
+              <a:pPr algn="ctr"/>
+              <a:r>
+                <a:rPr lang="en-US" sz="2000" dirty="0" smtClean="0">
+                  <a:latin typeface="Helvetica Neue"/>
+                  <a:cs typeface="Helvetica Neue"/>
+                </a:rPr>
+                <a:t>Download to </a:t>
+              </a:r>
+            </a:p>
+            <a:p>
+              <a:pPr algn="ctr"/>
+              <a:r>
+                <a:rPr lang="en-US" sz="2000" dirty="0" smtClean="0">
+                  <a:latin typeface="Helvetica Neue"/>
+                  <a:cs typeface="Helvetica Neue"/>
+                </a:rPr>
+                <a:t>PhyloSift Users</a:t>
+              </a:r>
+              <a:endParaRPr lang="en-US" sz="2000" dirty="0">
                 <a:latin typeface="Helvetica Neue"/>
                 <a:cs typeface="Helvetica Neue"/>
               </a:endParaRPr>
@@ -5418,23 +5315,26 @@
       <p:cxnSp>
         <p:nvCxnSpPr>
           <p:cNvPr id="106" name="Straight Arrow Connector 105"/>
-          <p:cNvCxnSpPr/>
+          <p:cNvCxnSpPr>
+            <a:stCxn id="86" idx="2"/>
+          </p:cNvCxnSpPr>
           <p:nvPr/>
         </p:nvCxnSpPr>
         <p:spPr>
           <a:xfrm>
-            <a:off x="8669868" y="15104534"/>
-            <a:ext cx="0" cy="732713"/>
+            <a:off x="8651874" y="14854773"/>
+            <a:ext cx="0" cy="796216"/>
           </a:xfrm>
           <a:prstGeom prst="straightConnector1">
             <a:avLst/>
           </a:prstGeom>
-          <a:ln w="50800">
+          <a:ln w="60325">
             <a:solidFill>
               <a:schemeClr val="tx1"/>
             </a:solidFill>
             <a:tailEnd type="triangle" w="lg" len="med"/>
           </a:ln>
+          <a:effectLst/>
         </p:spPr>
         <p:style>
           <a:lnRef idx="2">
@@ -5451,92 +5351,6 @@
           </a:fontRef>
         </p:style>
       </p:cxnSp>
-      <p:sp>
-        <p:nvSpPr>
-          <p:cNvPr id="2" name="TextBox 1"/>
-          <p:cNvSpPr txBox="1"/>
-          <p:nvPr/>
-        </p:nvSpPr>
-        <p:spPr>
-          <a:xfrm>
-            <a:off x="14058638" y="10389157"/>
-            <a:ext cx="2895598" cy="1754327"/>
-          </a:xfrm>
-          <a:prstGeom prst="rect">
-            <a:avLst/>
-          </a:prstGeom>
-          <a:solidFill>
-            <a:srgbClr val="FFFF66"/>
-          </a:solidFill>
-          <a:ln>
-            <a:solidFill>
-              <a:schemeClr val="tx1"/>
-            </a:solidFill>
-          </a:ln>
-        </p:spPr>
-        <p:txBody>
-          <a:bodyPr wrap="square" rtlCol="0">
-            <a:spAutoFit/>
-          </a:bodyPr>
-          <a:lstStyle/>
-          <a:p>
-            <a:r>
-              <a:rPr lang="en-US" sz="1800" dirty="0" smtClean="0"/>
-              <a:t>HB: Do </a:t>
-            </a:r>
-            <a:r>
-              <a:rPr lang="en-US" sz="1800" dirty="0"/>
-              <a:t>we just add new sequences to codon subtrees, or are the codon </a:t>
-            </a:r>
-            <a:r>
-              <a:rPr lang="en-US" sz="1800" dirty="0" err="1"/>
-              <a:t>subtree</a:t>
-            </a:r>
-            <a:r>
-              <a:rPr lang="en-US" sz="1800" dirty="0"/>
-              <a:t> markers completely replaced in this DB update process?</a:t>
-            </a:r>
-            <a:endParaRPr lang="en-US" sz="1800" dirty="0"/>
-          </a:p>
-        </p:txBody>
-      </p:sp>
-      <p:sp>
-        <p:nvSpPr>
-          <p:cNvPr id="82" name="TextBox 81"/>
-          <p:cNvSpPr txBox="1"/>
-          <p:nvPr/>
-        </p:nvSpPr>
-        <p:spPr>
-          <a:xfrm>
-            <a:off x="3369733" y="12302627"/>
-            <a:ext cx="3480817" cy="1477328"/>
-          </a:xfrm>
-          <a:prstGeom prst="rect">
-            <a:avLst/>
-          </a:prstGeom>
-          <a:solidFill>
-            <a:srgbClr val="FFFF66"/>
-          </a:solidFill>
-          <a:ln>
-            <a:solidFill>
-              <a:schemeClr val="tx1"/>
-            </a:solidFill>
-          </a:ln>
-        </p:spPr>
-        <p:txBody>
-          <a:bodyPr wrap="square" rtlCol="0">
-            <a:spAutoFit/>
-          </a:bodyPr>
-          <a:lstStyle/>
-          <a:p>
-            <a:r>
-              <a:rPr lang="en-US" sz="1800" dirty="0" smtClean="0"/>
-              <a:t>HB: I think this part might be incorrect – Guillaume mentioned we might still be using 2 parallel paths down here for the AA vs. Codon trees</a:t>
-            </a:r>
-            <a:endParaRPr lang="en-US" sz="1800" dirty="0"/>
-          </a:p>
-        </p:txBody>
-      </p:sp>
     </p:spTree>
     <p:extLst>
       <p:ext uri="{BB962C8B-B14F-4D97-AF65-F5344CB8AC3E}">

</xml_diff>

<commit_message>
Updated workflow diagrams to reflect new command line flags
</commit_message>
<xml_diff>
--- a/writing/figures/Phylosift_DBupdate.pptx
+++ b/writing/figures/Phylosift_DBupdate.pptx
@@ -295,7 +295,7 @@
           <a:p>
             <a:fld id="{1EB31AE5-1B8F-5848-93B8-66F20C8DE389}" type="datetimeFigureOut">
               <a:rPr lang="en-US" smtClean="0"/>
-              <a:t>5/30/12</a:t>
+              <a:t>11/26/12</a:t>
             </a:fld>
             <a:endParaRPr lang="en-US"/>
           </a:p>
@@ -465,7 +465,7 @@
           <a:p>
             <a:fld id="{1EB31AE5-1B8F-5848-93B8-66F20C8DE389}" type="datetimeFigureOut">
               <a:rPr lang="en-US" smtClean="0"/>
-              <a:t>5/30/12</a:t>
+              <a:t>11/26/12</a:t>
             </a:fld>
             <a:endParaRPr lang="en-US"/>
           </a:p>
@@ -645,7 +645,7 @@
           <a:p>
             <a:fld id="{1EB31AE5-1B8F-5848-93B8-66F20C8DE389}" type="datetimeFigureOut">
               <a:rPr lang="en-US" smtClean="0"/>
-              <a:t>5/30/12</a:t>
+              <a:t>11/26/12</a:t>
             </a:fld>
             <a:endParaRPr lang="en-US"/>
           </a:p>
@@ -815,7 +815,7 @@
           <a:p>
             <a:fld id="{1EB31AE5-1B8F-5848-93B8-66F20C8DE389}" type="datetimeFigureOut">
               <a:rPr lang="en-US" smtClean="0"/>
-              <a:t>5/30/12</a:t>
+              <a:t>11/26/12</a:t>
             </a:fld>
             <a:endParaRPr lang="en-US"/>
           </a:p>
@@ -1061,7 +1061,7 @@
           <a:p>
             <a:fld id="{1EB31AE5-1B8F-5848-93B8-66F20C8DE389}" type="datetimeFigureOut">
               <a:rPr lang="en-US" smtClean="0"/>
-              <a:t>5/30/12</a:t>
+              <a:t>11/26/12</a:t>
             </a:fld>
             <a:endParaRPr lang="en-US"/>
           </a:p>
@@ -1349,7 +1349,7 @@
           <a:p>
             <a:fld id="{1EB31AE5-1B8F-5848-93B8-66F20C8DE389}" type="datetimeFigureOut">
               <a:rPr lang="en-US" smtClean="0"/>
-              <a:t>5/30/12</a:t>
+              <a:t>11/26/12</a:t>
             </a:fld>
             <a:endParaRPr lang="en-US"/>
           </a:p>
@@ -1776,7 +1776,7 @@
           <a:p>
             <a:fld id="{1EB31AE5-1B8F-5848-93B8-66F20C8DE389}" type="datetimeFigureOut">
               <a:rPr lang="en-US" smtClean="0"/>
-              <a:t>5/30/12</a:t>
+              <a:t>11/26/12</a:t>
             </a:fld>
             <a:endParaRPr lang="en-US"/>
           </a:p>
@@ -1894,7 +1894,7 @@
           <a:p>
             <a:fld id="{1EB31AE5-1B8F-5848-93B8-66F20C8DE389}" type="datetimeFigureOut">
               <a:rPr lang="en-US" smtClean="0"/>
-              <a:t>5/30/12</a:t>
+              <a:t>11/26/12</a:t>
             </a:fld>
             <a:endParaRPr lang="en-US"/>
           </a:p>
@@ -1989,7 +1989,7 @@
           <a:p>
             <a:fld id="{1EB31AE5-1B8F-5848-93B8-66F20C8DE389}" type="datetimeFigureOut">
               <a:rPr lang="en-US" smtClean="0"/>
-              <a:t>5/30/12</a:t>
+              <a:t>11/26/12</a:t>
             </a:fld>
             <a:endParaRPr lang="en-US"/>
           </a:p>
@@ -2266,7 +2266,7 @@
           <a:p>
             <a:fld id="{1EB31AE5-1B8F-5848-93B8-66F20C8DE389}" type="datetimeFigureOut">
               <a:rPr lang="en-US" smtClean="0"/>
-              <a:t>5/30/12</a:t>
+              <a:t>11/26/12</a:t>
             </a:fld>
             <a:endParaRPr lang="en-US"/>
           </a:p>
@@ -2519,7 +2519,7 @@
           <a:p>
             <a:fld id="{1EB31AE5-1B8F-5848-93B8-66F20C8DE389}" type="datetimeFigureOut">
               <a:rPr lang="en-US" smtClean="0"/>
-              <a:t>5/30/12</a:t>
+              <a:t>11/26/12</a:t>
             </a:fld>
             <a:endParaRPr lang="en-US"/>
           </a:p>
@@ -2732,7 +2732,7 @@
           <a:p>
             <a:fld id="{1EB31AE5-1B8F-5848-93B8-66F20C8DE389}" type="datetimeFigureOut">
               <a:rPr lang="en-US" smtClean="0"/>
-              <a:t>5/30/12</a:t>
+              <a:t>11/26/12</a:t>
             </a:fld>
             <a:endParaRPr lang="en-US"/>
           </a:p>
@@ -3428,8 +3428,8 @@
         </p:nvSpPr>
         <p:spPr>
           <a:xfrm>
-            <a:off x="11288191" y="2835702"/>
-            <a:ext cx="3619750" cy="830997"/>
+            <a:off x="10949531" y="2988099"/>
+            <a:ext cx="3274468" cy="461665"/>
           </a:xfrm>
           <a:prstGeom prst="rect">
             <a:avLst/>
@@ -3460,13 +3460,21 @@
                   <a:srgbClr val="CA1E00"/>
                 </a:solidFill>
               </a:rPr>
-              <a:t>phylosift_dbupdate.pl</a:t>
-            </a:r>
-            <a:endParaRPr lang="en-US" sz="2400" dirty="0">
-              <a:solidFill>
-                <a:srgbClr val="000000"/>
-              </a:solidFill>
-            </a:endParaRPr>
+              <a:t>dbupdate</a:t>
+            </a:r>
+            <a:r>
+              <a:rPr lang="en-US" sz="2400" dirty="0">
+                <a:solidFill>
+                  <a:srgbClr val="CA1E00"/>
+                </a:solidFill>
+              </a:rPr>
+              <a:t> </a:t>
+            </a:r>
+            <a:r>
+              <a:rPr lang="en-US" sz="2400" dirty="0" smtClean="0"/>
+              <a:t>mode</a:t>
+            </a:r>
+            <a:endParaRPr lang="en-US" sz="2400" dirty="0"/>
           </a:p>
         </p:txBody>
       </p:sp>

</xml_diff>